<commit_message>
Add more for day1
introduction and design
</commit_message>
<xml_diff>
--- a/教学/Day1_Android_Overall.pptx
+++ b/教学/Day1_Android_Overall.pptx
@@ -1,6 +1,6 @@
 
 <file path=ppt/presentation.xml><?xml version="1.0" encoding="utf-8"?>
-<p:presentation xmlns:a="http://schemas.openxmlformats.org/drawingml/2006/main" xmlns:r="http://schemas.openxmlformats.org/officeDocument/2006/relationships" xmlns:p="http://schemas.openxmlformats.org/presentationml/2006/main" saveSubsetFonts="1">
+<p:presentation xmlns:a="http://schemas.openxmlformats.org/drawingml/2006/main" xmlns:r="http://schemas.openxmlformats.org/officeDocument/2006/relationships" xmlns:p="http://schemas.openxmlformats.org/presentationml/2006/main" saveSubsetFonts="1" bookmarkIdSeed="2">
   <p:sldMasterIdLst>
     <p:sldMasterId id="2147483648" r:id="rId1"/>
   </p:sldMasterIdLst>
@@ -269,7 +269,7 @@
           <a:p>
             <a:fld id="{A0424E31-BA8C-4DDB-93BE-6ACA89147A57}" type="datetimeFigureOut">
               <a:rPr lang="zh-CN" altLang="en-US" smtClean="0"/>
-              <a:t>2021/3/4</a:t>
+              <a:t>2021/3/28</a:t>
             </a:fld>
             <a:endParaRPr lang="zh-CN" altLang="en-US"/>
           </a:p>
@@ -467,7 +467,7 @@
           <a:p>
             <a:fld id="{A0424E31-BA8C-4DDB-93BE-6ACA89147A57}" type="datetimeFigureOut">
               <a:rPr lang="zh-CN" altLang="en-US" smtClean="0"/>
-              <a:t>2021/3/4</a:t>
+              <a:t>2021/3/28</a:t>
             </a:fld>
             <a:endParaRPr lang="zh-CN" altLang="en-US"/>
           </a:p>
@@ -675,7 +675,7 @@
           <a:p>
             <a:fld id="{A0424E31-BA8C-4DDB-93BE-6ACA89147A57}" type="datetimeFigureOut">
               <a:rPr lang="zh-CN" altLang="en-US" smtClean="0"/>
-              <a:t>2021/3/4</a:t>
+              <a:t>2021/3/28</a:t>
             </a:fld>
             <a:endParaRPr lang="zh-CN" altLang="en-US"/>
           </a:p>
@@ -873,7 +873,7 @@
           <a:p>
             <a:fld id="{A0424E31-BA8C-4DDB-93BE-6ACA89147A57}" type="datetimeFigureOut">
               <a:rPr lang="zh-CN" altLang="en-US" smtClean="0"/>
-              <a:t>2021/3/4</a:t>
+              <a:t>2021/3/28</a:t>
             </a:fld>
             <a:endParaRPr lang="zh-CN" altLang="en-US"/>
           </a:p>
@@ -1148,7 +1148,7 @@
           <a:p>
             <a:fld id="{A0424E31-BA8C-4DDB-93BE-6ACA89147A57}" type="datetimeFigureOut">
               <a:rPr lang="zh-CN" altLang="en-US" smtClean="0"/>
-              <a:t>2021/3/4</a:t>
+              <a:t>2021/3/28</a:t>
             </a:fld>
             <a:endParaRPr lang="zh-CN" altLang="en-US"/>
           </a:p>
@@ -1413,7 +1413,7 @@
           <a:p>
             <a:fld id="{A0424E31-BA8C-4DDB-93BE-6ACA89147A57}" type="datetimeFigureOut">
               <a:rPr lang="zh-CN" altLang="en-US" smtClean="0"/>
-              <a:t>2021/3/4</a:t>
+              <a:t>2021/3/28</a:t>
             </a:fld>
             <a:endParaRPr lang="zh-CN" altLang="en-US"/>
           </a:p>
@@ -1825,7 +1825,7 @@
           <a:p>
             <a:fld id="{A0424E31-BA8C-4DDB-93BE-6ACA89147A57}" type="datetimeFigureOut">
               <a:rPr lang="zh-CN" altLang="en-US" smtClean="0"/>
-              <a:t>2021/3/4</a:t>
+              <a:t>2021/3/28</a:t>
             </a:fld>
             <a:endParaRPr lang="zh-CN" altLang="en-US"/>
           </a:p>
@@ -1966,7 +1966,7 @@
           <a:p>
             <a:fld id="{A0424E31-BA8C-4DDB-93BE-6ACA89147A57}" type="datetimeFigureOut">
               <a:rPr lang="zh-CN" altLang="en-US" smtClean="0"/>
-              <a:t>2021/3/4</a:t>
+              <a:t>2021/3/28</a:t>
             </a:fld>
             <a:endParaRPr lang="zh-CN" altLang="en-US"/>
           </a:p>
@@ -2079,7 +2079,7 @@
           <a:p>
             <a:fld id="{A0424E31-BA8C-4DDB-93BE-6ACA89147A57}" type="datetimeFigureOut">
               <a:rPr lang="zh-CN" altLang="en-US" smtClean="0"/>
-              <a:t>2021/3/4</a:t>
+              <a:t>2021/3/28</a:t>
             </a:fld>
             <a:endParaRPr lang="zh-CN" altLang="en-US"/>
           </a:p>
@@ -2390,7 +2390,7 @@
           <a:p>
             <a:fld id="{A0424E31-BA8C-4DDB-93BE-6ACA89147A57}" type="datetimeFigureOut">
               <a:rPr lang="zh-CN" altLang="en-US" smtClean="0"/>
-              <a:t>2021/3/4</a:t>
+              <a:t>2021/3/28</a:t>
             </a:fld>
             <a:endParaRPr lang="zh-CN" altLang="en-US"/>
           </a:p>
@@ -2678,7 +2678,7 @@
           <a:p>
             <a:fld id="{A0424E31-BA8C-4DDB-93BE-6ACA89147A57}" type="datetimeFigureOut">
               <a:rPr lang="zh-CN" altLang="en-US" smtClean="0"/>
-              <a:t>2021/3/4</a:t>
+              <a:t>2021/3/28</a:t>
             </a:fld>
             <a:endParaRPr lang="zh-CN" altLang="en-US"/>
           </a:p>
@@ -2919,7 +2919,7 @@
           <a:p>
             <a:fld id="{A0424E31-BA8C-4DDB-93BE-6ACA89147A57}" type="datetimeFigureOut">
               <a:rPr lang="zh-CN" altLang="en-US" smtClean="0"/>
-              <a:t>2021/3/4</a:t>
+              <a:t>2021/3/28</a:t>
             </a:fld>
             <a:endParaRPr lang="zh-CN" altLang="en-US"/>
           </a:p>
@@ -3767,17 +3767,425 @@
           <a:lstStyle/>
           <a:p>
             <a:r>
-              <a:rPr lang="zh-CN" altLang="en-US" dirty="0"/>
-              <a:t>一句话说明 </a:t>
-            </a:r>
-            <a:r>
-              <a:rPr lang="en-US" altLang="zh-CN" dirty="0"/>
-              <a:t>Android </a:t>
-            </a:r>
-            <a:r>
-              <a:rPr lang="zh-CN" altLang="en-US" dirty="0"/>
-              <a:t>是什么？</a:t>
-            </a:r>
+              <a:rPr lang="en-US" altLang="zh-CN" b="0" i="0" dirty="0">
+                <a:solidFill>
+                  <a:srgbClr val="333333"/>
+                </a:solidFill>
+                <a:effectLst/>
+                <a:latin typeface="arial" panose="020B0604020202020204" pitchFamily="34" charset="0"/>
+              </a:rPr>
+              <a:t>Android (</a:t>
+            </a:r>
+            <a:r>
+              <a:rPr lang="zh-CN" altLang="en-US" b="0" i="0" dirty="0">
+                <a:solidFill>
+                  <a:srgbClr val="333333"/>
+                </a:solidFill>
+                <a:effectLst/>
+                <a:latin typeface="arial" panose="020B0604020202020204" pitchFamily="34" charset="0"/>
+              </a:rPr>
+              <a:t>安卓</a:t>
+            </a:r>
+            <a:r>
+              <a:rPr lang="en-US" altLang="zh-CN" b="0" i="0" dirty="0">
+                <a:solidFill>
+                  <a:srgbClr val="333333"/>
+                </a:solidFill>
+                <a:effectLst/>
+                <a:latin typeface="arial" panose="020B0604020202020204" pitchFamily="34" charset="0"/>
+              </a:rPr>
+              <a:t>) </a:t>
+            </a:r>
+            <a:r>
+              <a:rPr lang="zh-CN" altLang="en-US" b="0" i="0" dirty="0">
+                <a:solidFill>
+                  <a:srgbClr val="333333"/>
+                </a:solidFill>
+                <a:effectLst/>
+                <a:latin typeface="arial" panose="020B0604020202020204" pitchFamily="34" charset="0"/>
+              </a:rPr>
+              <a:t>是一种基于 </a:t>
+            </a:r>
+            <a:r>
+              <a:rPr lang="en-US" altLang="zh-CN" dirty="0">
+                <a:solidFill>
+                  <a:srgbClr val="136EC2"/>
+                </a:solidFill>
+                <a:latin typeface="arial" panose="020B0604020202020204" pitchFamily="34" charset="0"/>
+              </a:rPr>
+              <a:t>Linux </a:t>
+            </a:r>
+            <a:r>
+              <a:rPr lang="zh-CN" altLang="en-US" b="0" i="0" dirty="0">
+                <a:solidFill>
+                  <a:srgbClr val="333333"/>
+                </a:solidFill>
+                <a:effectLst/>
+                <a:latin typeface="arial" panose="020B0604020202020204" pitchFamily="34" charset="0"/>
+              </a:rPr>
+              <a:t>内核（不包含 </a:t>
+            </a:r>
+            <a:r>
+              <a:rPr lang="en-US" altLang="zh-CN" dirty="0">
+                <a:solidFill>
+                  <a:srgbClr val="136EC2"/>
+                </a:solidFill>
+                <a:latin typeface="arial" panose="020B0604020202020204" pitchFamily="34" charset="0"/>
+              </a:rPr>
+              <a:t>GNU </a:t>
+            </a:r>
+            <a:r>
+              <a:rPr lang="zh-CN" altLang="en-US" b="0" i="0" dirty="0">
+                <a:solidFill>
+                  <a:srgbClr val="333333"/>
+                </a:solidFill>
+                <a:effectLst/>
+                <a:latin typeface="arial" panose="020B0604020202020204" pitchFamily="34" charset="0"/>
+              </a:rPr>
+              <a:t>组件）的自由及</a:t>
+            </a:r>
+            <a:r>
+              <a:rPr lang="zh-CN" altLang="en-US" dirty="0">
+                <a:solidFill>
+                  <a:srgbClr val="136EC2"/>
+                </a:solidFill>
+                <a:latin typeface="arial" panose="020B0604020202020204" pitchFamily="34" charset="0"/>
+              </a:rPr>
+              <a:t>开放源代码</a:t>
+            </a:r>
+            <a:r>
+              <a:rPr lang="zh-CN" altLang="en-US" b="0" i="0" dirty="0">
+                <a:solidFill>
+                  <a:srgbClr val="333333"/>
+                </a:solidFill>
+                <a:effectLst/>
+                <a:latin typeface="arial" panose="020B0604020202020204" pitchFamily="34" charset="0"/>
+              </a:rPr>
+              <a:t>的</a:t>
+            </a:r>
+            <a:r>
+              <a:rPr lang="zh-CN" altLang="en-US" dirty="0">
+                <a:solidFill>
+                  <a:srgbClr val="136EC2"/>
+                </a:solidFill>
+                <a:latin typeface="arial" panose="020B0604020202020204" pitchFamily="34" charset="0"/>
+              </a:rPr>
+              <a:t>操作系统</a:t>
+            </a:r>
+            <a:r>
+              <a:rPr lang="zh-CN" altLang="en-US" b="0" i="0" dirty="0">
+                <a:solidFill>
+                  <a:srgbClr val="333333"/>
+                </a:solidFill>
+                <a:effectLst/>
+                <a:latin typeface="arial" panose="020B0604020202020204" pitchFamily="34" charset="0"/>
+              </a:rPr>
+              <a:t>。主要使用于</a:t>
+            </a:r>
+            <a:r>
+              <a:rPr lang="zh-CN" altLang="en-US" dirty="0">
+                <a:solidFill>
+                  <a:srgbClr val="136EC2"/>
+                </a:solidFill>
+                <a:latin typeface="arial" panose="020B0604020202020204" pitchFamily="34" charset="0"/>
+              </a:rPr>
+              <a:t>移动设备</a:t>
+            </a:r>
+            <a:r>
+              <a:rPr lang="zh-CN" altLang="en-US" b="0" i="0" dirty="0">
+                <a:solidFill>
+                  <a:srgbClr val="333333"/>
+                </a:solidFill>
+                <a:effectLst/>
+                <a:latin typeface="arial" panose="020B0604020202020204" pitchFamily="34" charset="0"/>
+              </a:rPr>
+              <a:t>，如</a:t>
+            </a:r>
+            <a:r>
+              <a:rPr lang="zh-CN" altLang="en-US" dirty="0">
+                <a:solidFill>
+                  <a:srgbClr val="136EC2"/>
+                </a:solidFill>
+                <a:latin typeface="arial" panose="020B0604020202020204" pitchFamily="34" charset="0"/>
+              </a:rPr>
+              <a:t>智能手机</a:t>
+            </a:r>
+            <a:r>
+              <a:rPr lang="zh-CN" altLang="en-US" b="0" i="0" dirty="0">
+                <a:solidFill>
+                  <a:srgbClr val="333333"/>
+                </a:solidFill>
+                <a:effectLst/>
+                <a:latin typeface="arial" panose="020B0604020202020204" pitchFamily="34" charset="0"/>
+              </a:rPr>
+              <a:t>和</a:t>
+            </a:r>
+            <a:r>
+              <a:rPr lang="zh-CN" altLang="en-US" dirty="0">
+                <a:solidFill>
+                  <a:srgbClr val="136EC2"/>
+                </a:solidFill>
+                <a:latin typeface="arial" panose="020B0604020202020204" pitchFamily="34" charset="0"/>
+              </a:rPr>
+              <a:t>平板电脑</a:t>
+            </a:r>
+            <a:r>
+              <a:rPr lang="zh-CN" altLang="en-US" b="0" i="0" dirty="0">
+                <a:solidFill>
+                  <a:srgbClr val="333333"/>
+                </a:solidFill>
+                <a:effectLst/>
+                <a:latin typeface="arial" panose="020B0604020202020204" pitchFamily="34" charset="0"/>
+              </a:rPr>
+              <a:t>，由美国 </a:t>
+            </a:r>
+            <a:r>
+              <a:rPr lang="en-US" altLang="zh-CN" dirty="0">
+                <a:solidFill>
+                  <a:srgbClr val="136EC2"/>
+                </a:solidFill>
+                <a:latin typeface="arial" panose="020B0604020202020204" pitchFamily="34" charset="0"/>
+              </a:rPr>
+              <a:t>Google </a:t>
+            </a:r>
+            <a:r>
+              <a:rPr lang="zh-CN" altLang="en-US" b="0" i="0" dirty="0">
+                <a:solidFill>
+                  <a:srgbClr val="333333"/>
+                </a:solidFill>
+                <a:effectLst/>
+                <a:latin typeface="arial" panose="020B0604020202020204" pitchFamily="34" charset="0"/>
+              </a:rPr>
+              <a:t>公司和</a:t>
+            </a:r>
+            <a:r>
+              <a:rPr lang="zh-CN" altLang="en-US" dirty="0">
+                <a:solidFill>
+                  <a:srgbClr val="136EC2"/>
+                </a:solidFill>
+                <a:latin typeface="arial" panose="020B0604020202020204" pitchFamily="34" charset="0"/>
+              </a:rPr>
+              <a:t>开放手机联盟</a:t>
+            </a:r>
+            <a:r>
+              <a:rPr lang="zh-CN" altLang="en-US" b="0" i="0" dirty="0">
+                <a:solidFill>
+                  <a:srgbClr val="333333"/>
+                </a:solidFill>
+                <a:effectLst/>
+                <a:latin typeface="arial" panose="020B0604020202020204" pitchFamily="34" charset="0"/>
+              </a:rPr>
+              <a:t>领导及开发</a:t>
+            </a:r>
+            <a:endParaRPr lang="en-US" altLang="zh-CN" dirty="0">
+              <a:solidFill>
+                <a:srgbClr val="333333"/>
+              </a:solidFill>
+              <a:latin typeface="arial" panose="020B0604020202020204" pitchFamily="34" charset="0"/>
+            </a:endParaRPr>
+          </a:p>
+          <a:p>
+            <a:pPr marL="0" indent="0">
+              <a:buNone/>
+            </a:pPr>
+            <a:endParaRPr lang="en-US" altLang="zh-CN" dirty="0">
+              <a:solidFill>
+                <a:srgbClr val="333333"/>
+              </a:solidFill>
+              <a:latin typeface="arial" panose="020B0604020202020204" pitchFamily="34" charset="0"/>
+            </a:endParaRPr>
+          </a:p>
+          <a:p>
+            <a:pPr algn="l"/>
+            <a:r>
+              <a:rPr lang="en-US" altLang="zh-CN" b="0" i="0" dirty="0">
+                <a:solidFill>
+                  <a:srgbClr val="121212"/>
+                </a:solidFill>
+                <a:effectLst/>
+                <a:latin typeface="-apple-system"/>
+              </a:rPr>
+              <a:t>Linux</a:t>
+            </a:r>
+            <a:r>
+              <a:rPr lang="zh-CN" altLang="en-US" b="0" i="0" dirty="0">
+                <a:solidFill>
+                  <a:srgbClr val="121212"/>
+                </a:solidFill>
+                <a:effectLst/>
+                <a:latin typeface="-apple-system"/>
+              </a:rPr>
+              <a:t>内核 </a:t>
+            </a:r>
+            <a:r>
+              <a:rPr lang="en-US" altLang="zh-CN" b="0" i="0" dirty="0">
+                <a:solidFill>
+                  <a:srgbClr val="121212"/>
+                </a:solidFill>
+                <a:effectLst/>
+                <a:latin typeface="-apple-system"/>
+              </a:rPr>
+              <a:t>——&gt; </a:t>
+            </a:r>
+            <a:r>
+              <a:rPr lang="zh-CN" altLang="en-US" b="0" i="0" dirty="0">
+                <a:solidFill>
+                  <a:srgbClr val="121212"/>
+                </a:solidFill>
+                <a:effectLst/>
+                <a:latin typeface="-apple-system"/>
+              </a:rPr>
+              <a:t>相当于飞机引擎</a:t>
+            </a:r>
+            <a:r>
+              <a:rPr lang="en-US" altLang="zh-CN" b="0" i="0" dirty="0">
+                <a:solidFill>
+                  <a:srgbClr val="121212"/>
+                </a:solidFill>
+                <a:effectLst/>
+                <a:latin typeface="-apple-system"/>
+              </a:rPr>
+              <a:t>+</a:t>
+            </a:r>
+            <a:r>
+              <a:rPr lang="zh-CN" altLang="en-US" b="0" i="0" dirty="0">
+                <a:solidFill>
+                  <a:srgbClr val="121212"/>
+                </a:solidFill>
+                <a:effectLst/>
+                <a:latin typeface="-apple-system"/>
+              </a:rPr>
+              <a:t>骨架</a:t>
+            </a:r>
+          </a:p>
+          <a:p>
+            <a:pPr algn="l"/>
+            <a:r>
+              <a:rPr lang="en-US" altLang="zh-CN" b="0" i="0" dirty="0">
+                <a:solidFill>
+                  <a:srgbClr val="121212"/>
+                </a:solidFill>
+                <a:effectLst/>
+                <a:latin typeface="-apple-system"/>
+              </a:rPr>
+              <a:t>Ubuntu</a:t>
+            </a:r>
+            <a:r>
+              <a:rPr lang="zh-CN" altLang="en-US" b="0" i="0" dirty="0">
+                <a:solidFill>
+                  <a:srgbClr val="121212"/>
+                </a:solidFill>
+                <a:effectLst/>
+                <a:latin typeface="-apple-system"/>
+              </a:rPr>
+              <a:t>系统 </a:t>
+            </a:r>
+            <a:r>
+              <a:rPr lang="en-US" altLang="zh-CN" b="0" i="0" dirty="0">
+                <a:solidFill>
+                  <a:srgbClr val="121212"/>
+                </a:solidFill>
+                <a:effectLst/>
+                <a:latin typeface="-apple-system"/>
+              </a:rPr>
+              <a:t>——&gt; </a:t>
+            </a:r>
+            <a:r>
+              <a:rPr lang="zh-CN" altLang="en-US" b="0" i="0" dirty="0">
+                <a:solidFill>
+                  <a:srgbClr val="121212"/>
+                </a:solidFill>
+                <a:effectLst/>
+                <a:latin typeface="-apple-system"/>
+              </a:rPr>
+              <a:t>相当于 </a:t>
+            </a:r>
+            <a:r>
+              <a:rPr lang="en-US" altLang="zh-CN" b="0" i="0" dirty="0">
+                <a:solidFill>
+                  <a:srgbClr val="121212"/>
+                </a:solidFill>
+                <a:effectLst/>
+                <a:latin typeface="-apple-system"/>
+              </a:rPr>
+              <a:t>F22</a:t>
+            </a:r>
+            <a:r>
+              <a:rPr lang="zh-CN" altLang="en-US" b="0" i="0" dirty="0">
+                <a:solidFill>
+                  <a:srgbClr val="121212"/>
+                </a:solidFill>
+                <a:effectLst/>
+                <a:latin typeface="-apple-system"/>
+              </a:rPr>
+              <a:t>战斗机</a:t>
+            </a:r>
+          </a:p>
+          <a:p>
+            <a:pPr algn="l"/>
+            <a:r>
+              <a:rPr lang="en-US" altLang="zh-CN" b="0" i="0" dirty="0">
+                <a:solidFill>
+                  <a:srgbClr val="121212"/>
+                </a:solidFill>
+                <a:effectLst/>
+                <a:latin typeface="-apple-system"/>
+              </a:rPr>
+              <a:t>Android</a:t>
+            </a:r>
+            <a:r>
+              <a:rPr lang="zh-CN" altLang="en-US" b="0" i="0" dirty="0">
+                <a:solidFill>
+                  <a:srgbClr val="121212"/>
+                </a:solidFill>
+                <a:effectLst/>
+                <a:latin typeface="-apple-system"/>
+              </a:rPr>
+              <a:t>系统 </a:t>
+            </a:r>
+            <a:r>
+              <a:rPr lang="en-US" altLang="zh-CN" b="0" i="0" dirty="0">
+                <a:solidFill>
+                  <a:srgbClr val="121212"/>
+                </a:solidFill>
+                <a:effectLst/>
+                <a:latin typeface="-apple-system"/>
+              </a:rPr>
+              <a:t>——&gt; </a:t>
+            </a:r>
+            <a:r>
+              <a:rPr lang="zh-CN" altLang="en-US" b="0" i="0" dirty="0">
+                <a:solidFill>
+                  <a:srgbClr val="121212"/>
+                </a:solidFill>
+                <a:effectLst/>
+                <a:latin typeface="-apple-system"/>
+              </a:rPr>
+              <a:t>相当于波音</a:t>
+            </a:r>
+            <a:r>
+              <a:rPr lang="en-US" altLang="zh-CN" b="0" i="0" dirty="0">
+                <a:solidFill>
+                  <a:srgbClr val="121212"/>
+                </a:solidFill>
+                <a:effectLst/>
+                <a:latin typeface="-apple-system"/>
+              </a:rPr>
+              <a:t>787</a:t>
+            </a:r>
+            <a:r>
+              <a:rPr lang="zh-CN" altLang="en-US" b="0" i="0" dirty="0">
+                <a:solidFill>
+                  <a:srgbClr val="121212"/>
+                </a:solidFill>
+                <a:effectLst/>
+                <a:latin typeface="-apple-system"/>
+              </a:rPr>
+              <a:t>客机</a:t>
+            </a:r>
+          </a:p>
+          <a:p>
+            <a:endParaRPr lang="zh-CN" altLang="en-US" dirty="0"/>
           </a:p>
         </p:txBody>
       </p:sp>
@@ -3932,7 +4340,165 @@
           <a:p>
             <a:r>
               <a:rPr lang="en-US" altLang="zh-CN" dirty="0"/>
-              <a:t>Android Hierarchy</a:t>
+              <a:t>Android </a:t>
+            </a:r>
+            <a:r>
+              <a:rPr lang="zh-CN" altLang="en-US" dirty="0"/>
+              <a:t>平台架构</a:t>
+            </a:r>
+          </a:p>
+        </p:txBody>
+      </p:sp>
+      <p:pic>
+        <p:nvPicPr>
+          <p:cNvPr id="5" name="内容占位符 4">
+            <a:extLst>
+              <a:ext uri="{FF2B5EF4-FFF2-40B4-BE49-F238E27FC236}">
+                <a16:creationId xmlns:a16="http://schemas.microsoft.com/office/drawing/2014/main" id="{833DFB0D-DE29-4E94-A0C3-4413C4BBA37A}"/>
+              </a:ext>
+            </a:extLst>
+          </p:cNvPr>
+          <p:cNvPicPr>
+            <a:picLocks noGrp="1" noChangeAspect="1"/>
+          </p:cNvPicPr>
+          <p:nvPr>
+            <p:ph idx="1"/>
+          </p:nvPr>
+        </p:nvPicPr>
+        <p:blipFill>
+          <a:blip r:embed="rId2">
+            <a:extLst>
+              <a:ext uri="{28A0092B-C50C-407E-A947-70E740481C1C}">
+                <a14:useLocalDpi xmlns:a14="http://schemas.microsoft.com/office/drawing/2010/main" val="0"/>
+              </a:ext>
+            </a:extLst>
+          </a:blip>
+          <a:stretch>
+            <a:fillRect/>
+          </a:stretch>
+        </p:blipFill>
+        <p:spPr>
+          <a:xfrm>
+            <a:off x="6935582" y="82900"/>
+            <a:ext cx="4600951" cy="6775100"/>
+          </a:xfrm>
+        </p:spPr>
+      </p:pic>
+      <p:sp>
+        <p:nvSpPr>
+          <p:cNvPr id="7" name="文本框 6">
+            <a:extLst>
+              <a:ext uri="{FF2B5EF4-FFF2-40B4-BE49-F238E27FC236}">
+                <a16:creationId xmlns:a16="http://schemas.microsoft.com/office/drawing/2014/main" id="{13C1C526-FA7E-4E9C-8C65-36A29E183CDB}"/>
+              </a:ext>
+            </a:extLst>
+          </p:cNvPr>
+          <p:cNvSpPr txBox="1"/>
+          <p:nvPr/>
+        </p:nvSpPr>
+        <p:spPr>
+          <a:xfrm>
+            <a:off x="274099" y="4645214"/>
+            <a:ext cx="6096740" cy="923330"/>
+          </a:xfrm>
+          <a:prstGeom prst="rect">
+            <a:avLst/>
+          </a:prstGeom>
+          <a:noFill/>
+        </p:spPr>
+        <p:txBody>
+          <a:bodyPr wrap="square">
+            <a:spAutoFit/>
+          </a:bodyPr>
+          <a:lstStyle/>
+          <a:p>
+            <a:r>
+              <a:rPr lang="en-US" altLang="zh-CN" b="0" i="0" dirty="0">
+                <a:solidFill>
+                  <a:srgbClr val="202124"/>
+                </a:solidFill>
+                <a:effectLst/>
+                <a:latin typeface="Roboto"/>
+              </a:rPr>
+              <a:t>Android </a:t>
+            </a:r>
+            <a:r>
+              <a:rPr lang="zh-CN" altLang="en-US" b="0" i="0" dirty="0">
+                <a:solidFill>
+                  <a:srgbClr val="202124"/>
+                </a:solidFill>
+                <a:effectLst/>
+                <a:latin typeface="Roboto"/>
+              </a:rPr>
+              <a:t>平台的基础是 </a:t>
+            </a:r>
+            <a:r>
+              <a:rPr lang="en-US" altLang="zh-CN" b="0" i="0" dirty="0">
+                <a:solidFill>
+                  <a:srgbClr val="202124"/>
+                </a:solidFill>
+                <a:effectLst/>
+                <a:latin typeface="Roboto"/>
+              </a:rPr>
+              <a:t>Linux </a:t>
+            </a:r>
+            <a:r>
+              <a:rPr lang="zh-CN" altLang="en-US" b="0" i="0" dirty="0">
+                <a:solidFill>
+                  <a:srgbClr val="202124"/>
+                </a:solidFill>
+                <a:effectLst/>
+                <a:latin typeface="Roboto"/>
+              </a:rPr>
+              <a:t>内核。例如，</a:t>
+            </a:r>
+            <a:r>
+              <a:rPr lang="en-US" altLang="zh-CN" b="0" i="0" dirty="0">
+                <a:effectLst/>
+                <a:latin typeface="Roboto"/>
+                <a:hlinkClick r:id="rId3"/>
+              </a:rPr>
+              <a:t>Android Runtime (ART)</a:t>
+            </a:r>
+            <a:r>
+              <a:rPr lang="en-US" altLang="zh-CN" b="0" i="0" dirty="0">
+                <a:solidFill>
+                  <a:srgbClr val="202124"/>
+                </a:solidFill>
+                <a:effectLst/>
+                <a:latin typeface="Roboto"/>
+              </a:rPr>
+              <a:t> </a:t>
+            </a:r>
+            <a:r>
+              <a:rPr lang="zh-CN" altLang="en-US" b="0" i="0" dirty="0">
+                <a:solidFill>
+                  <a:srgbClr val="202124"/>
+                </a:solidFill>
+                <a:effectLst/>
+                <a:latin typeface="Roboto"/>
+              </a:rPr>
+              <a:t>依靠 </a:t>
+            </a:r>
+            <a:r>
+              <a:rPr lang="en-US" altLang="zh-CN" b="0" i="0" dirty="0">
+                <a:solidFill>
+                  <a:srgbClr val="202124"/>
+                </a:solidFill>
+                <a:effectLst/>
+                <a:latin typeface="Roboto"/>
+              </a:rPr>
+              <a:t>Linux </a:t>
+            </a:r>
+            <a:r>
+              <a:rPr lang="zh-CN" altLang="en-US" b="0" i="0" dirty="0">
+                <a:solidFill>
+                  <a:srgbClr val="202124"/>
+                </a:solidFill>
+                <a:effectLst/>
+                <a:latin typeface="Roboto"/>
+              </a:rPr>
+              <a:t>内核来执行底层功能，例如线程和低层内存管理</a:t>
             </a:r>
             <a:endParaRPr lang="zh-CN" altLang="en-US" dirty="0"/>
           </a:p>
@@ -3940,25 +4506,440 @@
       </p:sp>
       <p:sp>
         <p:nvSpPr>
-          <p:cNvPr id="3" name="内容占位符 2">
-            <a:extLst>
-              <a:ext uri="{FF2B5EF4-FFF2-40B4-BE49-F238E27FC236}">
-                <a16:creationId xmlns:a16="http://schemas.microsoft.com/office/drawing/2014/main" id="{DE654EB6-A60A-4C8A-A0ED-B48B25027839}"/>
-              </a:ext>
-            </a:extLst>
-          </p:cNvPr>
-          <p:cNvSpPr>
-            <a:spLocks noGrp="1"/>
-          </p:cNvSpPr>
-          <p:nvPr>
-            <p:ph idx="1"/>
-          </p:nvPr>
-        </p:nvSpPr>
-        <p:spPr/>
-        <p:txBody>
-          <a:bodyPr/>
-          <a:lstStyle/>
-          <a:p>
+          <p:cNvPr id="9" name="文本框 8">
+            <a:extLst>
+              <a:ext uri="{FF2B5EF4-FFF2-40B4-BE49-F238E27FC236}">
+                <a16:creationId xmlns:a16="http://schemas.microsoft.com/office/drawing/2014/main" id="{86716A73-E83F-4F3F-BF0B-45E664EAE21D}"/>
+              </a:ext>
+            </a:extLst>
+          </p:cNvPr>
+          <p:cNvSpPr txBox="1"/>
+          <p:nvPr/>
+        </p:nvSpPr>
+        <p:spPr>
+          <a:xfrm>
+            <a:off x="274099" y="3686426"/>
+            <a:ext cx="6096740" cy="923330"/>
+          </a:xfrm>
+          <a:prstGeom prst="rect">
+            <a:avLst/>
+          </a:prstGeom>
+          <a:noFill/>
+        </p:spPr>
+        <p:txBody>
+          <a:bodyPr wrap="square">
+            <a:spAutoFit/>
+          </a:bodyPr>
+          <a:lstStyle/>
+          <a:p>
+            <a:r>
+              <a:rPr lang="zh-CN" altLang="en-US" b="0" i="0" dirty="0">
+                <a:effectLst/>
+                <a:latin typeface="Roboto"/>
+                <a:hlinkClick r:id="rId4"/>
+              </a:rPr>
+              <a:t>硬件抽象层 </a:t>
+            </a:r>
+            <a:r>
+              <a:rPr lang="en-US" altLang="zh-CN" b="0" i="0" dirty="0">
+                <a:effectLst/>
+                <a:latin typeface="Roboto"/>
+                <a:hlinkClick r:id="rId4"/>
+              </a:rPr>
+              <a:t>(HAL)</a:t>
+            </a:r>
+            <a:r>
+              <a:rPr lang="zh-CN" altLang="en-US" b="0" i="0" dirty="0">
+                <a:solidFill>
+                  <a:srgbClr val="202124"/>
+                </a:solidFill>
+                <a:effectLst/>
+                <a:latin typeface="Roboto"/>
+              </a:rPr>
+              <a:t> 提供标准界面，向更高级别的 </a:t>
+            </a:r>
+            <a:r>
+              <a:rPr lang="en-US" altLang="zh-CN" b="0" i="0" dirty="0">
+                <a:effectLst/>
+                <a:latin typeface="Roboto"/>
+                <a:hlinkClick r:id="rId5"/>
+              </a:rPr>
+              <a:t>Java API </a:t>
+            </a:r>
+            <a:r>
+              <a:rPr lang="zh-CN" altLang="en-US" b="0" i="0" dirty="0">
+                <a:effectLst/>
+                <a:latin typeface="Roboto"/>
+                <a:hlinkClick r:id="rId5"/>
+              </a:rPr>
+              <a:t>框架</a:t>
+            </a:r>
+            <a:r>
+              <a:rPr lang="zh-CN" altLang="en-US" b="0" i="0" dirty="0">
+                <a:solidFill>
+                  <a:srgbClr val="202124"/>
+                </a:solidFill>
+                <a:effectLst/>
+                <a:latin typeface="Roboto"/>
+              </a:rPr>
+              <a:t>显示设备硬件功能。</a:t>
+            </a:r>
+            <a:r>
+              <a:rPr lang="en-US" altLang="zh-CN" b="0" i="0" dirty="0">
+                <a:solidFill>
+                  <a:srgbClr val="202124"/>
+                </a:solidFill>
+                <a:effectLst/>
+                <a:latin typeface="Roboto"/>
+              </a:rPr>
+              <a:t>HAL </a:t>
+            </a:r>
+            <a:r>
+              <a:rPr lang="zh-CN" altLang="en-US" b="0" i="0" dirty="0">
+                <a:solidFill>
+                  <a:srgbClr val="202124"/>
+                </a:solidFill>
+                <a:effectLst/>
+                <a:latin typeface="Roboto"/>
+              </a:rPr>
+              <a:t>包含多个库模块，其中每个模块都为特定类型的硬件组件实现一个界面</a:t>
+            </a:r>
+            <a:endParaRPr lang="zh-CN" altLang="en-US" dirty="0"/>
+          </a:p>
+        </p:txBody>
+      </p:sp>
+      <p:sp>
+        <p:nvSpPr>
+          <p:cNvPr id="11" name="文本框 10">
+            <a:extLst>
+              <a:ext uri="{FF2B5EF4-FFF2-40B4-BE49-F238E27FC236}">
+                <a16:creationId xmlns:a16="http://schemas.microsoft.com/office/drawing/2014/main" id="{2D1F6874-8C83-4463-ACEA-02408E35E975}"/>
+              </a:ext>
+            </a:extLst>
+          </p:cNvPr>
+          <p:cNvSpPr txBox="1"/>
+          <p:nvPr/>
+        </p:nvSpPr>
+        <p:spPr>
+          <a:xfrm>
+            <a:off x="274099" y="2280212"/>
+            <a:ext cx="6096740" cy="646331"/>
+          </a:xfrm>
+          <a:prstGeom prst="rect">
+            <a:avLst/>
+          </a:prstGeom>
+          <a:noFill/>
+        </p:spPr>
+        <p:txBody>
+          <a:bodyPr wrap="square">
+            <a:spAutoFit/>
+          </a:bodyPr>
+          <a:lstStyle/>
+          <a:p>
+            <a:r>
+              <a:rPr lang="zh-CN" altLang="en-US" b="0" i="0" dirty="0">
+                <a:solidFill>
+                  <a:srgbClr val="202124"/>
+                </a:solidFill>
+                <a:effectLst/>
+                <a:latin typeface="Roboto"/>
+              </a:rPr>
+              <a:t>核心 </a:t>
+            </a:r>
+            <a:r>
+              <a:rPr lang="en-US" altLang="zh-CN" b="0" i="0" dirty="0">
+                <a:solidFill>
+                  <a:srgbClr val="202124"/>
+                </a:solidFill>
+                <a:effectLst/>
+                <a:latin typeface="Roboto"/>
+              </a:rPr>
+              <a:t>Android </a:t>
+            </a:r>
+            <a:r>
+              <a:rPr lang="zh-CN" altLang="en-US" b="0" i="0" dirty="0">
+                <a:solidFill>
+                  <a:srgbClr val="202124"/>
+                </a:solidFill>
+                <a:effectLst/>
+                <a:latin typeface="Roboto"/>
+              </a:rPr>
+              <a:t>系统组件和服务（例如 </a:t>
+            </a:r>
+            <a:r>
+              <a:rPr lang="en-US" altLang="zh-CN" b="0" i="0" dirty="0">
+                <a:solidFill>
+                  <a:srgbClr val="202124"/>
+                </a:solidFill>
+                <a:effectLst/>
+                <a:latin typeface="Roboto"/>
+              </a:rPr>
+              <a:t>ART </a:t>
+            </a:r>
+            <a:r>
+              <a:rPr lang="zh-CN" altLang="en-US" b="0" i="0" dirty="0">
+                <a:solidFill>
+                  <a:srgbClr val="202124"/>
+                </a:solidFill>
+                <a:effectLst/>
+                <a:latin typeface="Roboto"/>
+              </a:rPr>
+              <a:t>和 </a:t>
+            </a:r>
+            <a:r>
+              <a:rPr lang="en-US" altLang="zh-CN" b="0" i="0" dirty="0">
+                <a:solidFill>
+                  <a:srgbClr val="202124"/>
+                </a:solidFill>
+                <a:effectLst/>
+                <a:latin typeface="Roboto"/>
+              </a:rPr>
+              <a:t>HAL</a:t>
+            </a:r>
+            <a:r>
+              <a:rPr lang="zh-CN" altLang="en-US" b="0" i="0" dirty="0">
+                <a:solidFill>
+                  <a:srgbClr val="202124"/>
+                </a:solidFill>
+                <a:effectLst/>
+                <a:latin typeface="Roboto"/>
+              </a:rPr>
+              <a:t>）构建自原生代码，需要以 </a:t>
+            </a:r>
+            <a:r>
+              <a:rPr lang="en-US" altLang="zh-CN" b="0" i="0" dirty="0">
+                <a:solidFill>
+                  <a:srgbClr val="202124"/>
+                </a:solidFill>
+                <a:effectLst/>
+                <a:latin typeface="Roboto"/>
+              </a:rPr>
+              <a:t>C </a:t>
+            </a:r>
+            <a:r>
+              <a:rPr lang="zh-CN" altLang="en-US" b="0" i="0" dirty="0">
+                <a:solidFill>
+                  <a:srgbClr val="202124"/>
+                </a:solidFill>
+                <a:effectLst/>
+                <a:latin typeface="Roboto"/>
+              </a:rPr>
+              <a:t>和 </a:t>
+            </a:r>
+            <a:r>
+              <a:rPr lang="en-US" altLang="zh-CN" b="0" i="0" dirty="0">
+                <a:solidFill>
+                  <a:srgbClr val="202124"/>
+                </a:solidFill>
+                <a:effectLst/>
+                <a:latin typeface="Roboto"/>
+              </a:rPr>
+              <a:t>C++ </a:t>
+            </a:r>
+            <a:r>
+              <a:rPr lang="zh-CN" altLang="en-US" b="0" i="0" dirty="0">
+                <a:solidFill>
+                  <a:srgbClr val="202124"/>
+                </a:solidFill>
+                <a:effectLst/>
+                <a:latin typeface="Roboto"/>
+              </a:rPr>
+              <a:t>编写的原生库</a:t>
+            </a:r>
+            <a:endParaRPr lang="zh-CN" altLang="en-US" dirty="0"/>
+          </a:p>
+        </p:txBody>
+      </p:sp>
+      <p:sp>
+        <p:nvSpPr>
+          <p:cNvPr id="13" name="文本框 12">
+            <a:extLst>
+              <a:ext uri="{FF2B5EF4-FFF2-40B4-BE49-F238E27FC236}">
+                <a16:creationId xmlns:a16="http://schemas.microsoft.com/office/drawing/2014/main" id="{FDC287DA-D240-4B38-B432-111878DE3762}"/>
+              </a:ext>
+            </a:extLst>
+          </p:cNvPr>
+          <p:cNvSpPr txBox="1"/>
+          <p:nvPr/>
+        </p:nvSpPr>
+        <p:spPr>
+          <a:xfrm>
+            <a:off x="274099" y="1339153"/>
+            <a:ext cx="6096740" cy="923330"/>
+          </a:xfrm>
+          <a:prstGeom prst="rect">
+            <a:avLst/>
+          </a:prstGeom>
+          <a:noFill/>
+        </p:spPr>
+        <p:txBody>
+          <a:bodyPr wrap="square">
+            <a:spAutoFit/>
+          </a:bodyPr>
+          <a:lstStyle/>
+          <a:p>
+            <a:r>
+              <a:rPr lang="zh-CN" altLang="en-US" b="0" i="0" dirty="0">
+                <a:solidFill>
+                  <a:srgbClr val="202124"/>
+                </a:solidFill>
+                <a:effectLst/>
+                <a:latin typeface="Roboto"/>
+              </a:rPr>
+              <a:t>以 </a:t>
+            </a:r>
+            <a:r>
+              <a:rPr lang="en-US" altLang="zh-CN" b="0" i="0" dirty="0">
+                <a:solidFill>
+                  <a:srgbClr val="202124"/>
+                </a:solidFill>
+                <a:effectLst/>
+                <a:latin typeface="Roboto"/>
+              </a:rPr>
+              <a:t>Java </a:t>
+            </a:r>
+            <a:r>
+              <a:rPr lang="zh-CN" altLang="en-US" b="0" i="0" dirty="0">
+                <a:solidFill>
+                  <a:srgbClr val="202124"/>
+                </a:solidFill>
+                <a:effectLst/>
+                <a:latin typeface="Roboto"/>
+              </a:rPr>
+              <a:t>语言编写的 </a:t>
+            </a:r>
+            <a:r>
+              <a:rPr lang="en-US" altLang="zh-CN" b="0" i="0" dirty="0">
+                <a:solidFill>
+                  <a:srgbClr val="202124"/>
+                </a:solidFill>
+                <a:effectLst/>
+                <a:latin typeface="Roboto"/>
+              </a:rPr>
+              <a:t>API </a:t>
+            </a:r>
+            <a:r>
+              <a:rPr lang="zh-CN" altLang="en-US" b="0" i="0" dirty="0">
+                <a:solidFill>
+                  <a:srgbClr val="202124"/>
+                </a:solidFill>
+                <a:effectLst/>
+                <a:latin typeface="Roboto"/>
+              </a:rPr>
+              <a:t>使用 </a:t>
+            </a:r>
+            <a:r>
+              <a:rPr lang="en-US" altLang="zh-CN" b="0" i="0" dirty="0">
+                <a:solidFill>
+                  <a:srgbClr val="202124"/>
+                </a:solidFill>
+                <a:effectLst/>
+                <a:latin typeface="Roboto"/>
+              </a:rPr>
+              <a:t>Android OS </a:t>
+            </a:r>
+            <a:r>
+              <a:rPr lang="zh-CN" altLang="en-US" b="0" i="0" dirty="0">
+                <a:solidFill>
+                  <a:srgbClr val="202124"/>
+                </a:solidFill>
+                <a:effectLst/>
+                <a:latin typeface="Roboto"/>
+              </a:rPr>
+              <a:t>的整个功能集。这些 </a:t>
+            </a:r>
+            <a:r>
+              <a:rPr lang="en-US" altLang="zh-CN" b="0" i="0" dirty="0">
+                <a:solidFill>
+                  <a:srgbClr val="202124"/>
+                </a:solidFill>
+                <a:effectLst/>
+                <a:latin typeface="Roboto"/>
+              </a:rPr>
+              <a:t>API </a:t>
+            </a:r>
+            <a:r>
+              <a:rPr lang="zh-CN" altLang="en-US" b="0" i="0" dirty="0">
+                <a:solidFill>
+                  <a:srgbClr val="202124"/>
+                </a:solidFill>
+                <a:effectLst/>
+                <a:latin typeface="Roboto"/>
+              </a:rPr>
+              <a:t>形成创建 </a:t>
+            </a:r>
+            <a:r>
+              <a:rPr lang="en-US" altLang="zh-CN" b="0" i="0" dirty="0">
+                <a:solidFill>
+                  <a:srgbClr val="202124"/>
+                </a:solidFill>
+                <a:effectLst/>
+                <a:latin typeface="Roboto"/>
+              </a:rPr>
+              <a:t>Android </a:t>
+            </a:r>
+            <a:r>
+              <a:rPr lang="zh-CN" altLang="en-US" b="0" i="0" dirty="0">
+                <a:solidFill>
+                  <a:srgbClr val="202124"/>
+                </a:solidFill>
+                <a:effectLst/>
+                <a:latin typeface="Roboto"/>
+              </a:rPr>
+              <a:t>应用所需的构建块，它们可简化核心模块化系统组件和服务的重复使用</a:t>
+            </a:r>
+            <a:endParaRPr lang="zh-CN" altLang="en-US" dirty="0"/>
+          </a:p>
+        </p:txBody>
+      </p:sp>
+      <p:sp>
+        <p:nvSpPr>
+          <p:cNvPr id="15" name="文本框 14">
+            <a:extLst>
+              <a:ext uri="{FF2B5EF4-FFF2-40B4-BE49-F238E27FC236}">
+                <a16:creationId xmlns:a16="http://schemas.microsoft.com/office/drawing/2014/main" id="{1E1CB6A5-3DCD-4013-9B25-1C409EB222FC}"/>
+              </a:ext>
+            </a:extLst>
+          </p:cNvPr>
+          <p:cNvSpPr txBox="1"/>
+          <p:nvPr/>
+        </p:nvSpPr>
+        <p:spPr>
+          <a:xfrm>
+            <a:off x="274099" y="41959"/>
+            <a:ext cx="6096740" cy="646331"/>
+          </a:xfrm>
+          <a:prstGeom prst="rect">
+            <a:avLst/>
+          </a:prstGeom>
+          <a:noFill/>
+        </p:spPr>
+        <p:txBody>
+          <a:bodyPr wrap="square">
+            <a:spAutoFit/>
+          </a:bodyPr>
+          <a:lstStyle/>
+          <a:p>
+            <a:r>
+              <a:rPr lang="en-US" altLang="zh-CN" b="0" i="0" dirty="0">
+                <a:solidFill>
+                  <a:srgbClr val="202124"/>
+                </a:solidFill>
+                <a:effectLst/>
+                <a:latin typeface="Roboto"/>
+              </a:rPr>
+              <a:t>Android </a:t>
+            </a:r>
+            <a:r>
+              <a:rPr lang="zh-CN" altLang="en-US" b="0" i="0" dirty="0">
+                <a:solidFill>
+                  <a:srgbClr val="202124"/>
+                </a:solidFill>
+                <a:effectLst/>
+                <a:latin typeface="Roboto"/>
+              </a:rPr>
+              <a:t>随附一套用于电子邮件、短信、日历、互联网浏览和联系人等的核心应用</a:t>
+            </a:r>
             <a:endParaRPr lang="zh-CN" altLang="en-US" dirty="0"/>
           </a:p>
         </p:txBody>

</xml_diff>

<commit_message>
modify a little bit
</commit_message>
<xml_diff>
--- a/教学/Day1_Android_Overall.pptx
+++ b/教学/Day1_Android_Overall.pptx
@@ -269,7 +269,7 @@
           <a:p>
             <a:fld id="{A0424E31-BA8C-4DDB-93BE-6ACA89147A57}" type="datetimeFigureOut">
               <a:rPr lang="zh-CN" altLang="en-US" smtClean="0"/>
-              <a:t>2021/3/28</a:t>
+              <a:t>2021/4/5</a:t>
             </a:fld>
             <a:endParaRPr lang="zh-CN" altLang="en-US"/>
           </a:p>
@@ -467,7 +467,7 @@
           <a:p>
             <a:fld id="{A0424E31-BA8C-4DDB-93BE-6ACA89147A57}" type="datetimeFigureOut">
               <a:rPr lang="zh-CN" altLang="en-US" smtClean="0"/>
-              <a:t>2021/3/28</a:t>
+              <a:t>2021/4/5</a:t>
             </a:fld>
             <a:endParaRPr lang="zh-CN" altLang="en-US"/>
           </a:p>
@@ -675,7 +675,7 @@
           <a:p>
             <a:fld id="{A0424E31-BA8C-4DDB-93BE-6ACA89147A57}" type="datetimeFigureOut">
               <a:rPr lang="zh-CN" altLang="en-US" smtClean="0"/>
-              <a:t>2021/3/28</a:t>
+              <a:t>2021/4/5</a:t>
             </a:fld>
             <a:endParaRPr lang="zh-CN" altLang="en-US"/>
           </a:p>
@@ -873,7 +873,7 @@
           <a:p>
             <a:fld id="{A0424E31-BA8C-4DDB-93BE-6ACA89147A57}" type="datetimeFigureOut">
               <a:rPr lang="zh-CN" altLang="en-US" smtClean="0"/>
-              <a:t>2021/3/28</a:t>
+              <a:t>2021/4/5</a:t>
             </a:fld>
             <a:endParaRPr lang="zh-CN" altLang="en-US"/>
           </a:p>
@@ -1148,7 +1148,7 @@
           <a:p>
             <a:fld id="{A0424E31-BA8C-4DDB-93BE-6ACA89147A57}" type="datetimeFigureOut">
               <a:rPr lang="zh-CN" altLang="en-US" smtClean="0"/>
-              <a:t>2021/3/28</a:t>
+              <a:t>2021/4/5</a:t>
             </a:fld>
             <a:endParaRPr lang="zh-CN" altLang="en-US"/>
           </a:p>
@@ -1413,7 +1413,7 @@
           <a:p>
             <a:fld id="{A0424E31-BA8C-4DDB-93BE-6ACA89147A57}" type="datetimeFigureOut">
               <a:rPr lang="zh-CN" altLang="en-US" smtClean="0"/>
-              <a:t>2021/3/28</a:t>
+              <a:t>2021/4/5</a:t>
             </a:fld>
             <a:endParaRPr lang="zh-CN" altLang="en-US"/>
           </a:p>
@@ -1825,7 +1825,7 @@
           <a:p>
             <a:fld id="{A0424E31-BA8C-4DDB-93BE-6ACA89147A57}" type="datetimeFigureOut">
               <a:rPr lang="zh-CN" altLang="en-US" smtClean="0"/>
-              <a:t>2021/3/28</a:t>
+              <a:t>2021/4/5</a:t>
             </a:fld>
             <a:endParaRPr lang="zh-CN" altLang="en-US"/>
           </a:p>
@@ -1966,7 +1966,7 @@
           <a:p>
             <a:fld id="{A0424E31-BA8C-4DDB-93BE-6ACA89147A57}" type="datetimeFigureOut">
               <a:rPr lang="zh-CN" altLang="en-US" smtClean="0"/>
-              <a:t>2021/3/28</a:t>
+              <a:t>2021/4/5</a:t>
             </a:fld>
             <a:endParaRPr lang="zh-CN" altLang="en-US"/>
           </a:p>
@@ -2079,7 +2079,7 @@
           <a:p>
             <a:fld id="{A0424E31-BA8C-4DDB-93BE-6ACA89147A57}" type="datetimeFigureOut">
               <a:rPr lang="zh-CN" altLang="en-US" smtClean="0"/>
-              <a:t>2021/3/28</a:t>
+              <a:t>2021/4/5</a:t>
             </a:fld>
             <a:endParaRPr lang="zh-CN" altLang="en-US"/>
           </a:p>
@@ -2390,7 +2390,7 @@
           <a:p>
             <a:fld id="{A0424E31-BA8C-4DDB-93BE-6ACA89147A57}" type="datetimeFigureOut">
               <a:rPr lang="zh-CN" altLang="en-US" smtClean="0"/>
-              <a:t>2021/3/28</a:t>
+              <a:t>2021/4/5</a:t>
             </a:fld>
             <a:endParaRPr lang="zh-CN" altLang="en-US"/>
           </a:p>
@@ -2678,7 +2678,7 @@
           <a:p>
             <a:fld id="{A0424E31-BA8C-4DDB-93BE-6ACA89147A57}" type="datetimeFigureOut">
               <a:rPr lang="zh-CN" altLang="en-US" smtClean="0"/>
-              <a:t>2021/3/28</a:t>
+              <a:t>2021/4/5</a:t>
             </a:fld>
             <a:endParaRPr lang="zh-CN" altLang="en-US"/>
           </a:p>
@@ -2919,7 +2919,7 @@
           <a:p>
             <a:fld id="{A0424E31-BA8C-4DDB-93BE-6ACA89147A57}" type="datetimeFigureOut">
               <a:rPr lang="zh-CN" altLang="en-US" smtClean="0"/>
-              <a:t>2021/3/28</a:t>
+              <a:t>2021/4/5</a:t>
             </a:fld>
             <a:endParaRPr lang="zh-CN" altLang="en-US"/>
           </a:p>
@@ -4284,6 +4284,22 @@
               <a:rPr lang="zh-CN" altLang="en-US" dirty="0"/>
               <a:t>是什么，每一代都经历了什么</a:t>
             </a:r>
+            <a:endParaRPr lang="en-US" altLang="zh-CN" dirty="0"/>
+          </a:p>
+          <a:p>
+            <a:r>
+              <a:rPr lang="zh-CN" altLang="en-US" dirty="0"/>
+              <a:t>播放一个</a:t>
+            </a:r>
+            <a:r>
+              <a:rPr lang="en-US" altLang="zh-CN" dirty="0"/>
+              <a:t>8</a:t>
+            </a:r>
+            <a:r>
+              <a:rPr lang="zh-CN" altLang="en-US" dirty="0"/>
+              <a:t>分钟的视频</a:t>
+            </a:r>
+            <a:endParaRPr lang="en-US" altLang="zh-CN" dirty="0"/>
           </a:p>
         </p:txBody>
       </p:sp>
@@ -4944,6 +4960,60 @@
           </a:p>
         </p:txBody>
       </p:sp>
+      <p:sp>
+        <p:nvSpPr>
+          <p:cNvPr id="3" name="矩形 2">
+            <a:extLst>
+              <a:ext uri="{FF2B5EF4-FFF2-40B4-BE49-F238E27FC236}">
+                <a16:creationId xmlns:a16="http://schemas.microsoft.com/office/drawing/2014/main" id="{9732EFD1-973F-416E-AF81-7CFD7B078739}"/>
+              </a:ext>
+            </a:extLst>
+          </p:cNvPr>
+          <p:cNvSpPr/>
+          <p:nvPr/>
+        </p:nvSpPr>
+        <p:spPr>
+          <a:xfrm>
+            <a:off x="6935582" y="82900"/>
+            <a:ext cx="4600951" cy="4293791"/>
+          </a:xfrm>
+          <a:prstGeom prst="rect">
+            <a:avLst/>
+          </a:prstGeom>
+          <a:noFill/>
+          <a:ln w="34925">
+            <a:solidFill>
+              <a:schemeClr val="accent1">
+                <a:shade val="50000"/>
+              </a:schemeClr>
+            </a:solidFill>
+          </a:ln>
+        </p:spPr>
+        <p:style>
+          <a:lnRef idx="2">
+            <a:schemeClr val="accent1">
+              <a:shade val="50000"/>
+            </a:schemeClr>
+          </a:lnRef>
+          <a:fillRef idx="1">
+            <a:schemeClr val="accent1"/>
+          </a:fillRef>
+          <a:effectRef idx="0">
+            <a:schemeClr val="accent1"/>
+          </a:effectRef>
+          <a:fontRef idx="minor">
+            <a:schemeClr val="lt1"/>
+          </a:fontRef>
+        </p:style>
+        <p:txBody>
+          <a:bodyPr rtlCol="0" anchor="ctr"/>
+          <a:lstStyle/>
+          <a:p>
+            <a:pPr algn="ctr"/>
+            <a:endParaRPr lang="zh-CN" altLang="en-US"/>
+          </a:p>
+        </p:txBody>
+      </p:sp>
     </p:spTree>
     <p:extLst>
       <p:ext uri="{BB962C8B-B14F-4D97-AF65-F5344CB8AC3E}">
@@ -5024,7 +5094,7 @@
           <a:bodyPr/>
           <a:lstStyle/>
           <a:p>
-            <a:endParaRPr lang="zh-CN" altLang="en-US"/>
+            <a:endParaRPr lang="zh-CN" altLang="en-US" dirty="0"/>
           </a:p>
         </p:txBody>
       </p:sp>

</xml_diff>